<commit_message>
mise à jour cahier des charges
</commit_message>
<xml_diff>
--- a/Réalisation portfolio/Cahier des charges.pptx
+++ b/Réalisation portfolio/Cahier des charges.pptx
@@ -5608,20 +5608,20 @@
         <p:spPr/>
         <p:txBody>
           <a:bodyPr>
-            <a:normAutofit fontScale="70000" lnSpcReduction="20000"/>
+            <a:normAutofit/>
           </a:bodyPr>
           <a:lstStyle/>
           <a:p>
-            <a:pPr marL="228600" lvl="0" indent="-226059">
+            <a:pPr lvl="0">
               <a:spcBef>
                 <a:spcPts val="0"/>
               </a:spcBef>
               <a:buClr>
                 <a:schemeClr val="dk1"/>
               </a:buClr>
-              <a:buSzPts val="1760"/>
+              <a:buSzPts val="2800"/>
               <a:buFont typeface="Montserrat"/>
-              <a:buAutoNum type="arabicPeriod"/>
+              <a:buChar char="•"/>
             </a:pPr>
             <a:r>
               <a:rPr lang="fr-FR" dirty="0">
@@ -5630,21 +5630,17 @@
                 <a:cs typeface="Montserrat"/>
                 <a:sym typeface="Montserrat"/>
               </a:rPr>
-              <a:t>Présentation du projet</a:t>
-            </a:r>
-          </a:p>
-          <a:p>
-            <a:pPr marL="228600" lvl="0" indent="-226059">
-              <a:spcBef>
-                <a:spcPts val="1800"/>
-              </a:spcBef>
-              <a:buClr>
-                <a:schemeClr val="dk1"/>
-              </a:buClr>
-              <a:buSzPts val="1760"/>
-              <a:buFont typeface="Montserrat"/>
-              <a:buAutoNum type="arabicPeriod"/>
-            </a:pPr>
+              <a:t>Présentation d’un portfolio pour répondre à une proposition de poste chez un client de l’aéronautique « </a:t>
+            </a:r>
+            <a:r>
+              <a:rPr lang="fr-FR" dirty="0" err="1">
+                <a:latin typeface="Montserrat"/>
+                <a:ea typeface="Montserrat"/>
+                <a:cs typeface="Montserrat"/>
+                <a:sym typeface="Montserrat"/>
+              </a:rPr>
+              <a:t>Aeroworld</a:t>
+            </a:r>
             <a:r>
               <a:rPr lang="fr-FR" dirty="0">
                 <a:latin typeface="Montserrat"/>
@@ -5652,17 +5648,20 @@
                 <a:cs typeface="Montserrat"/>
                 <a:sym typeface="Montserrat"/>
               </a:rPr>
-              <a:t>Enjeux et objectifs</a:t>
-            </a:r>
-          </a:p>
-          <a:p>
-            <a:pPr marL="228600" lvl="0" indent="-226059">
+              <a:t> ». </a:t>
+            </a:r>
+          </a:p>
+          <a:p>
+            <a:pPr lvl="0">
               <a:spcBef>
-                <a:spcPts val="1800"/>
+                <a:spcPts val="0"/>
               </a:spcBef>
-              <a:buSzPts val="1760"/>
+              <a:buClr>
+                <a:schemeClr val="dk1"/>
+              </a:buClr>
+              <a:buSzPts val="2800"/>
               <a:buFont typeface="Montserrat"/>
-              <a:buAutoNum type="arabicPeriod"/>
+              <a:buChar char="•"/>
             </a:pPr>
             <a:r>
               <a:rPr lang="fr-FR" dirty="0">
@@ -5671,149 +5670,7 @@
                 <a:cs typeface="Montserrat"/>
                 <a:sym typeface="Montserrat"/>
               </a:rPr>
-              <a:t>Équipe projet</a:t>
-            </a:r>
-          </a:p>
-          <a:p>
-            <a:pPr marL="228600" lvl="0" indent="-226059">
-              <a:spcBef>
-                <a:spcPts val="1800"/>
-              </a:spcBef>
-              <a:buSzPts val="1760"/>
-              <a:buFont typeface="Montserrat"/>
-              <a:buAutoNum type="arabicPeriod"/>
-            </a:pPr>
-            <a:r>
-              <a:rPr lang="fr-FR" dirty="0">
-                <a:latin typeface="Montserrat"/>
-                <a:ea typeface="Montserrat"/>
-                <a:cs typeface="Montserrat"/>
-                <a:sym typeface="Montserrat"/>
-              </a:rPr>
-              <a:t>Spécifications ergonomiques</a:t>
-            </a:r>
-          </a:p>
-          <a:p>
-            <a:pPr marL="228600" lvl="0" indent="-226059">
-              <a:spcBef>
-                <a:spcPts val="1800"/>
-              </a:spcBef>
-              <a:buSzPts val="1760"/>
-              <a:buFont typeface="Montserrat"/>
-              <a:buAutoNum type="arabicPeriod"/>
-            </a:pPr>
-            <a:r>
-              <a:rPr lang="fr-FR" dirty="0">
-                <a:latin typeface="Montserrat"/>
-                <a:ea typeface="Montserrat"/>
-                <a:cs typeface="Montserrat"/>
-                <a:sym typeface="Montserrat"/>
-              </a:rPr>
-              <a:t>Spécifications fonctionnelles</a:t>
-            </a:r>
-          </a:p>
-          <a:p>
-            <a:pPr marL="228600" lvl="0" indent="-226059">
-              <a:spcBef>
-                <a:spcPts val="1800"/>
-              </a:spcBef>
-              <a:buSzPts val="1760"/>
-              <a:buFont typeface="Montserrat"/>
-              <a:buAutoNum type="arabicPeriod"/>
-            </a:pPr>
-            <a:r>
-              <a:rPr lang="fr-FR" dirty="0">
-                <a:latin typeface="Montserrat"/>
-                <a:ea typeface="Montserrat"/>
-                <a:cs typeface="Montserrat"/>
-                <a:sym typeface="Montserrat"/>
-              </a:rPr>
-              <a:t>Spécifications techniques</a:t>
-            </a:r>
-          </a:p>
-          <a:p>
-            <a:pPr marL="228600" lvl="0" indent="-226059">
-              <a:spcBef>
-                <a:spcPts val="1800"/>
-              </a:spcBef>
-              <a:buSzPts val="1760"/>
-              <a:buFont typeface="Montserrat"/>
-              <a:buAutoNum type="arabicPeriod"/>
-            </a:pPr>
-            <a:r>
-              <a:rPr lang="fr-FR" dirty="0">
-                <a:latin typeface="Montserrat"/>
-                <a:ea typeface="Montserrat"/>
-                <a:cs typeface="Montserrat"/>
-                <a:sym typeface="Montserrat"/>
-              </a:rPr>
-              <a:t>Contraintes techniques et réglementaires</a:t>
-            </a:r>
-          </a:p>
-          <a:p>
-            <a:pPr marL="228600" lvl="0" indent="-226059">
-              <a:spcBef>
-                <a:spcPts val="1800"/>
-              </a:spcBef>
-              <a:buClr>
-                <a:schemeClr val="dk1"/>
-              </a:buClr>
-              <a:buSzPts val="1760"/>
-              <a:buFont typeface="Montserrat"/>
-              <a:buAutoNum type="arabicPeriod"/>
-            </a:pPr>
-            <a:r>
-              <a:rPr lang="fr-FR" dirty="0">
-                <a:latin typeface="Montserrat"/>
-                <a:ea typeface="Montserrat"/>
-                <a:cs typeface="Montserrat"/>
-                <a:sym typeface="Montserrat"/>
-              </a:rPr>
-              <a:t>Qualité et performance</a:t>
-            </a:r>
-          </a:p>
-          <a:p>
-            <a:pPr marL="228600" lvl="0" indent="-226059">
-              <a:spcBef>
-                <a:spcPts val="1800"/>
-              </a:spcBef>
-              <a:buClr>
-                <a:schemeClr val="dk1"/>
-              </a:buClr>
-              <a:buSzPts val="1760"/>
-              <a:buFont typeface="Montserrat"/>
-              <a:buAutoNum type="arabicPeriod"/>
-            </a:pPr>
-            <a:r>
-              <a:rPr lang="fr-FR" dirty="0">
-                <a:latin typeface="Montserrat"/>
-                <a:ea typeface="Montserrat"/>
-                <a:cs typeface="Montserrat"/>
-                <a:sym typeface="Montserrat"/>
-              </a:rPr>
-              <a:t>Rétroplanning</a:t>
-            </a:r>
-          </a:p>
-          <a:p>
-            <a:pPr marL="228600" lvl="0" indent="-226059">
-              <a:spcBef>
-                <a:spcPts val="1800"/>
-              </a:spcBef>
-              <a:buClr>
-                <a:schemeClr val="dk1"/>
-              </a:buClr>
-              <a:buSzPts val="1760"/>
-              <a:buFont typeface="Montserrat"/>
-              <a:buAutoNum type="arabicPeriod"/>
-            </a:pPr>
-            <a:r>
-              <a:rPr lang="fr-FR" dirty="0">
-                <a:latin typeface="Montserrat"/>
-                <a:ea typeface="Montserrat"/>
-                <a:cs typeface="Montserrat"/>
-                <a:sym typeface="Montserrat"/>
-              </a:rPr>
-              <a:t>Devis</a:t>
+              <a:t>Le projet reprend l’ensemble des livrables attendu par le client avec les exigences et le planning, détaillé dans ce document</a:t>
             </a:r>
           </a:p>
         </p:txBody>

</xml_diff>